<commit_message>
commit code trong luc semina
com
</commit_message>
<xml_diff>
--- a/Flow control.pptx
+++ b/Flow control.pptx
@@ -5986,7 +5986,7 @@
           </a:effectLst>
           <a:extLst>
             <a:ext uri="{91240B29-F687-4f45-9708-019B960494DF}">
-              <a14:hiddenLine xmlns:a16="http://schemas.microsoft.com/office/drawing/2014/main" xmlns:p14="http://schemas.microsoft.com/office/powerpoint/2010/main" xmlns:a14="http://schemas.microsoft.com/office/drawing/2010/main" xmlns="" w="9525">
+              <a14:hiddenLine xmlns="" xmlns:a14="http://schemas.microsoft.com/office/drawing/2010/main" xmlns:p14="http://schemas.microsoft.com/office/powerpoint/2010/main" xmlns:a16="http://schemas.microsoft.com/office/drawing/2014/main" w="9525">
                 <a:solidFill>
                   <a:srgbClr val="000000"/>
                 </a:solidFill>
@@ -9288,6 +9288,24 @@
 </file>
 
 <file path=customXml/item1.xml><?xml version="1.0" encoding="utf-8"?>
+<?mso-contentType ?>
+<FormTemplates xmlns="http://schemas.microsoft.com/sharepoint/v3/contenttype/forms">
+  <Display>DocumentLibraryForm</Display>
+  <Edit>DocumentLibraryForm</Edit>
+  <New>DocumentLibraryForm</New>
+</FormTemplates>
+</file>
+
+<file path=customXml/item2.xml><?xml version="1.0" encoding="utf-8"?>
+<p:properties xmlns:p="http://schemas.microsoft.com/office/2006/metadata/properties" xmlns:xsi="http://www.w3.org/2001/XMLSchema-instance" xmlns:pc="http://schemas.microsoft.com/office/infopath/2007/PartnerControls">
+  <documentManagement>
+    <Status xmlns="71af3243-3dd4-4a8d-8c0d-dd76da1f02a5">Not started</Status>
+    <MediaServiceKeyPoints xmlns="71af3243-3dd4-4a8d-8c0d-dd76da1f02a5" xsi:nil="true"/>
+  </documentManagement>
+</p:properties>
+</file>
+
+<file path=customXml/item3.xml><?xml version="1.0" encoding="utf-8"?>
 <ct:contentTypeSchema xmlns:ct="http://schemas.microsoft.com/office/2006/metadata/contentType" xmlns:ma="http://schemas.microsoft.com/office/2006/metadata/properties/metaAttributes" ct:_="" ma:_="" ma:contentTypeName="Document" ma:contentTypeID="0x01010079F111ED35F8CC479449609E8A0923A6" ma:contentTypeVersion="12" ma:contentTypeDescription="Create a new document." ma:contentTypeScope="" ma:versionID="a410dd7f93c95333ffa1b60ed6adedd1">
   <xsd:schema xmlns:xsd="http://www.w3.org/2001/XMLSchema" xmlns:xs="http://www.w3.org/2001/XMLSchema" xmlns:p="http://schemas.microsoft.com/office/2006/metadata/properties" xmlns:ns2="71af3243-3dd4-4a8d-8c0d-dd76da1f02a5" xmlns:ns3="16c05727-aa75-4e4a-9b5f-8a80a1165891" targetNamespace="http://schemas.microsoft.com/office/2006/metadata/properties" ma:root="true" ma:fieldsID="a936d9baba76aa3866493feff160faab" ns2:_="" ns3:_="">
     <xsd:import namespace="71af3243-3dd4-4a8d-8c0d-dd76da1f02a5"/>
@@ -9508,25 +9526,25 @@
 </ct:contentTypeSchema>
 </file>
 
-<file path=customXml/item2.xml><?xml version="1.0" encoding="utf-8"?>
-<p:properties xmlns:p="http://schemas.microsoft.com/office/2006/metadata/properties" xmlns:xsi="http://www.w3.org/2001/XMLSchema-instance" xmlns:pc="http://schemas.microsoft.com/office/infopath/2007/PartnerControls">
-  <documentManagement>
-    <Status xmlns="71af3243-3dd4-4a8d-8c0d-dd76da1f02a5">Not started</Status>
-    <MediaServiceKeyPoints xmlns="71af3243-3dd4-4a8d-8c0d-dd76da1f02a5" xsi:nil="true"/>
-  </documentManagement>
-</p:properties>
+<file path=customXml/itemProps1.xml><?xml version="1.0" encoding="utf-8"?>
+<ds:datastoreItem xmlns:ds="http://schemas.openxmlformats.org/officeDocument/2006/customXml" ds:itemID="{30CB38EC-895A-4F8F-8F75-E263501ABB5A}">
+  <ds:schemaRefs>
+    <ds:schemaRef ds:uri="http://schemas.microsoft.com/sharepoint/v3/contenttype/forms"/>
+  </ds:schemaRefs>
+</ds:datastoreItem>
 </file>
 
-<file path=customXml/item3.xml><?xml version="1.0" encoding="utf-8"?>
-<?mso-contentType ?>
-<FormTemplates xmlns="http://schemas.microsoft.com/sharepoint/v3/contenttype/forms">
-  <Display>DocumentLibraryForm</Display>
-  <Edit>DocumentLibraryForm</Edit>
-  <New>DocumentLibraryForm</New>
-</FormTemplates>
+<file path=customXml/itemProps2.xml><?xml version="1.0" encoding="utf-8"?>
+<ds:datastoreItem xmlns:ds="http://schemas.openxmlformats.org/officeDocument/2006/customXml" ds:itemID="{F7E70FC5-1855-47AB-8CE1-CB3C873A8988}">
+  <ds:schemaRefs>
+    <ds:schemaRef ds:uri="http://schemas.microsoft.com/office/2006/metadata/properties"/>
+    <ds:schemaRef ds:uri="http://schemas.microsoft.com/office/infopath/2007/PartnerControls"/>
+    <ds:schemaRef ds:uri="71af3243-3dd4-4a8d-8c0d-dd76da1f02a5"/>
+  </ds:schemaRefs>
+</ds:datastoreItem>
 </file>
 
-<file path=customXml/itemProps1.xml><?xml version="1.0" encoding="utf-8"?>
+<file path=customXml/itemProps3.xml><?xml version="1.0" encoding="utf-8"?>
 <ds:datastoreItem xmlns:ds="http://schemas.openxmlformats.org/officeDocument/2006/customXml" ds:itemID="{5560E646-30AD-4BA0-97EA-A7A07DF5499A}">
   <ds:schemaRefs>
     <ds:schemaRef ds:uri="http://schemas.microsoft.com/office/2006/metadata/contentType"/>
@@ -9543,22 +9561,4 @@
     <ds:schemaRef ds:uri="http://schemas.microsoft.com/internal/obd"/>
   </ds:schemaRefs>
 </ds:datastoreItem>
-</file>
-
-<file path=customXml/itemProps2.xml><?xml version="1.0" encoding="utf-8"?>
-<ds:datastoreItem xmlns:ds="http://schemas.openxmlformats.org/officeDocument/2006/customXml" ds:itemID="{F7E70FC5-1855-47AB-8CE1-CB3C873A8988}">
-  <ds:schemaRefs>
-    <ds:schemaRef ds:uri="http://schemas.microsoft.com/office/2006/metadata/properties"/>
-    <ds:schemaRef ds:uri="http://schemas.microsoft.com/office/infopath/2007/PartnerControls"/>
-    <ds:schemaRef ds:uri="71af3243-3dd4-4a8d-8c0d-dd76da1f02a5"/>
-  </ds:schemaRefs>
-</ds:datastoreItem>
-</file>
-
-<file path=customXml/itemProps3.xml><?xml version="1.0" encoding="utf-8"?>
-<ds:datastoreItem xmlns:ds="http://schemas.openxmlformats.org/officeDocument/2006/customXml" ds:itemID="{30CB38EC-895A-4F8F-8F75-E263501ABB5A}">
-  <ds:schemaRefs>
-    <ds:schemaRef ds:uri="http://schemas.microsoft.com/sharepoint/v3/contenttype/forms"/>
-  </ds:schemaRefs>
-</ds:datastoreItem>
 </file>
</xml_diff>